<commit_message>
ADD : P16 pdf
</commit_message>
<xml_diff>
--- a/Paper_review/P16.pptx
+++ b/Paper_review/P16.pptx
@@ -27,7 +27,7 @@
     <p:sldId id="274" r:id="rId18"/>
   </p:sldIdLst>
   <p:sldSz cx="20104100" cy="11309350"/>
-  <p:notesSz cx="20104100" cy="11309350"/>
+  <p:notesSz cx="6858000" cy="9945688"/>
   <p:defaultTextStyle>
     <a:defPPr>
       <a:defRPr lang="ko-KR"/>
@@ -140,12 +140,12 @@
     </p:ext>
     <p:ext uri="{2D200454-40CA-4A62-9FC3-DE9A4176ACB9}">
       <p15:notesGuideLst xmlns:p15="http://schemas.microsoft.com/office/powerpoint/2012/main">
-        <p15:guide id="1" orient="horz" pos="3560">
+        <p15:guide id="1" orient="horz" pos="3131" userDrawn="1">
           <p15:clr>
             <a:srgbClr val="A4A3A4"/>
           </p15:clr>
         </p15:guide>
-        <p15:guide id="2" pos="6331">
+        <p15:guide id="2" pos="2159" userDrawn="1">
           <p15:clr>
             <a:srgbClr val="A4A3A4"/>
           </p15:clr>
@@ -190,18 +190,18 @@
         </p:nvSpPr>
         <p:spPr>
           <a:xfrm>
-            <a:off x="0" y="0"/>
-            <a:ext cx="8711777" cy="565467"/>
+            <a:off x="1" y="0"/>
+            <a:ext cx="2971800" cy="497284"/>
           </a:xfrm>
           <a:prstGeom prst="rect">
             <a:avLst/>
           </a:prstGeom>
         </p:spPr>
         <p:txBody>
-          <a:bodyPr vert="horz" lIns="91440" tIns="45720" rIns="91440" bIns="45720"/>
+          <a:bodyPr vert="horz" lIns="48911" tIns="24456" rIns="48911" bIns="24456"/>
           <a:lstStyle>
             <a:lvl1pPr algn="l">
-              <a:defRPr sz="1200"/>
+              <a:defRPr sz="600"/>
             </a:lvl1pPr>
           </a:lstStyle>
           <a:p>
@@ -224,18 +224,18 @@
         </p:nvSpPr>
         <p:spPr>
           <a:xfrm>
-            <a:off x="11387672" y="0"/>
-            <a:ext cx="8711777" cy="565467"/>
+            <a:off x="3884614" y="0"/>
+            <a:ext cx="2971800" cy="497284"/>
           </a:xfrm>
           <a:prstGeom prst="rect">
             <a:avLst/>
           </a:prstGeom>
         </p:spPr>
         <p:txBody>
-          <a:bodyPr vert="horz" lIns="91440" tIns="45720" rIns="91440" bIns="45720"/>
+          <a:bodyPr vert="horz" lIns="48911" tIns="24456" rIns="48911" bIns="24456"/>
           <a:lstStyle>
             <a:lvl1pPr algn="r">
-              <a:defRPr sz="1200"/>
+              <a:defRPr sz="600"/>
             </a:lvl1pPr>
           </a:lstStyle>
           <a:p>
@@ -265,8 +265,8 @@
         </p:nvSpPr>
         <p:spPr>
           <a:xfrm>
-            <a:off x="6282531" y="848201"/>
-            <a:ext cx="7539038" cy="4241006"/>
+            <a:off x="114300" y="746125"/>
+            <a:ext cx="6629400" cy="3729038"/>
           </a:xfrm>
           <a:prstGeom prst="rect">
             <a:avLst/>
@@ -279,7 +279,7 @@
           </a:ln>
         </p:spPr>
         <p:txBody>
-          <a:bodyPr vert="horz" lIns="91440" tIns="45720" rIns="91440" bIns="45720" anchor="ctr"/>
+          <a:bodyPr vert="horz" lIns="48911" tIns="24456" rIns="48911" bIns="24456" anchor="ctr"/>
           <a:lstStyle/>
           <a:p>
             <a:pPr lvl="0">
@@ -301,15 +301,15 @@
         </p:nvSpPr>
         <p:spPr>
           <a:xfrm>
-            <a:off x="2010410" y="5371941"/>
-            <a:ext cx="16083281" cy="5089207"/>
+            <a:off x="685800" y="4724202"/>
+            <a:ext cx="5486401" cy="4475559"/>
           </a:xfrm>
           <a:prstGeom prst="rect">
             <a:avLst/>
           </a:prstGeom>
         </p:spPr>
         <p:txBody>
-          <a:bodyPr vert="horz" lIns="91440" tIns="45720" rIns="91440" bIns="45720">
+          <a:bodyPr vert="horz" lIns="48911" tIns="24456" rIns="48911" bIns="24456">
             <a:noAutofit/>
           </a:bodyPr>
           <a:lstStyle/>
@@ -372,18 +372,18 @@
         </p:nvSpPr>
         <p:spPr>
           <a:xfrm>
-            <a:off x="0" y="10741920"/>
-            <a:ext cx="8711777" cy="565467"/>
+            <a:off x="1" y="9446678"/>
+            <a:ext cx="2971800" cy="497284"/>
           </a:xfrm>
           <a:prstGeom prst="rect">
             <a:avLst/>
           </a:prstGeom>
         </p:spPr>
         <p:txBody>
-          <a:bodyPr vert="horz" lIns="91440" tIns="45720" rIns="91440" bIns="45720" anchor="b"/>
+          <a:bodyPr vert="horz" lIns="48911" tIns="24456" rIns="48911" bIns="24456" anchor="b"/>
           <a:lstStyle>
             <a:lvl1pPr algn="l">
-              <a:defRPr sz="1200"/>
+              <a:defRPr sz="600"/>
             </a:lvl1pPr>
           </a:lstStyle>
           <a:p>
@@ -406,18 +406,18 @@
         </p:nvSpPr>
         <p:spPr>
           <a:xfrm>
-            <a:off x="11387672" y="10741920"/>
-            <a:ext cx="8711777" cy="565467"/>
+            <a:off x="3884614" y="9446678"/>
+            <a:ext cx="2971800" cy="497284"/>
           </a:xfrm>
           <a:prstGeom prst="rect">
             <a:avLst/>
           </a:prstGeom>
         </p:spPr>
         <p:txBody>
-          <a:bodyPr vert="horz" lIns="91440" tIns="45720" rIns="91440" bIns="45720" anchor="b"/>
+          <a:bodyPr vert="horz" lIns="48911" tIns="24456" rIns="48911" bIns="24456" anchor="b"/>
           <a:lstStyle>
             <a:lvl1pPr algn="r">
-              <a:defRPr sz="1200"/>
+              <a:defRPr sz="600"/>
             </a:lvl1pPr>
           </a:lstStyle>
           <a:p>
@@ -563,8 +563,8 @@
         </p:nvSpPr>
         <p:spPr>
           <a:xfrm>
-            <a:off x="6281738" y="847725"/>
-            <a:ext cx="7540625" cy="4241800"/>
+            <a:off x="112713" y="744538"/>
+            <a:ext cx="6632575" cy="3730625"/>
           </a:xfrm>
         </p:spPr>
         <p:txBody>
@@ -702,8 +702,8 @@
         </p:nvSpPr>
         <p:spPr>
           <a:xfrm>
-            <a:off x="6281738" y="847725"/>
-            <a:ext cx="7540625" cy="4241800"/>
+            <a:off x="112713" y="744538"/>
+            <a:ext cx="6632575" cy="3730625"/>
           </a:xfrm>
         </p:spPr>
       </p:sp>
@@ -843,8 +843,8 @@
         </p:nvSpPr>
         <p:spPr>
           <a:xfrm>
-            <a:off x="6281738" y="847725"/>
-            <a:ext cx="7540625" cy="4241800"/>
+            <a:off x="112713" y="744538"/>
+            <a:ext cx="6632575" cy="3730625"/>
           </a:xfrm>
         </p:spPr>
       </p:sp>
@@ -916,14 +916,14 @@
                     <m:sSub>
                       <m:sSubPr>
                         <m:ctrlPr>
-                          <a:rPr lang="en-US" altLang="ko-KR" sz="1200" i="1" smtClean="0">
+                          <a:rPr lang="en-US" altLang="ko-KR" sz="600" i="1">
                             <a:latin typeface="Cambria Math" panose="02040503050406030204" pitchFamily="18" charset="0"/>
                           </a:rPr>
                         </m:ctrlPr>
                       </m:sSubPr>
                       <m:e>
                         <m:r>
-                          <a:rPr lang="en-US" altLang="ko-KR" sz="1200" b="0" i="1" smtClean="0">
+                          <a:rPr lang="en-US" altLang="ko-KR" sz="600" i="1">
                             <a:latin typeface="Cambria Math" panose="02040503050406030204" pitchFamily="18" charset="0"/>
                           </a:rPr>
                           <m:t>𝐼</m:t>
@@ -931,7 +931,7 @@
                       </m:e>
                       <m:sub>
                         <m:r>
-                          <a:rPr lang="en-US" altLang="ko-KR" sz="1200" b="0" i="1" smtClean="0">
+                          <a:rPr lang="en-US" altLang="ko-KR" sz="600" i="1">
                             <a:latin typeface="Cambria Math" panose="02040503050406030204" pitchFamily="18" charset="0"/>
                           </a:rPr>
                           <m:t>2</m:t>
@@ -941,19 +941,19 @@
                   </m:oMath>
                 </a14:m>
                 <a:r>
-                  <a:rPr lang="ko-KR" altLang="en-US" sz="1200" dirty="0" smtClean="0"/>
+                  <a:rPr lang="ko-KR" altLang="en-US" sz="600" dirty="0"/>
                   <a:t>의</a:t>
                 </a:r>
                 <a:r>
-                  <a:rPr lang="en-US" altLang="ko-KR" sz="1200" dirty="0"/>
+                  <a:rPr lang="en-US" altLang="ko-KR" sz="600" dirty="0"/>
                   <a:t> </a:t>
                 </a:r>
                 <a:r>
-                  <a:rPr lang="en-US" altLang="ko-KR" sz="1200" dirty="0" smtClean="0"/>
+                  <a:rPr lang="en-US" altLang="ko-KR" sz="600" dirty="0"/>
                   <a:t>texture</a:t>
                 </a:r>
                 <a:r>
-                  <a:rPr lang="ko-KR" altLang="en-US" sz="1200" dirty="0" smtClean="0"/>
+                  <a:rPr lang="ko-KR" altLang="en-US" sz="600" dirty="0"/>
                   <a:t>를 </a:t>
                 </a:r>
                 <a14:m>
@@ -961,14 +961,14 @@
                     <m:sSub>
                       <m:sSubPr>
                         <m:ctrlPr>
-                          <a:rPr lang="en-US" altLang="ko-KR" sz="1200" i="1">
+                          <a:rPr lang="en-US" altLang="ko-KR" sz="600" i="1">
                             <a:latin typeface="Cambria Math" panose="02040503050406030204" pitchFamily="18" charset="0"/>
                           </a:rPr>
                         </m:ctrlPr>
                       </m:sSubPr>
                       <m:e>
                         <m:r>
-                          <a:rPr lang="en-US" altLang="ko-KR" sz="1200" i="1">
+                          <a:rPr lang="en-US" altLang="ko-KR" sz="600" i="1">
                             <a:latin typeface="Cambria Math" panose="02040503050406030204" pitchFamily="18" charset="0"/>
                           </a:rPr>
                           <m:t>𝐼</m:t>
@@ -976,7 +976,7 @@
                       </m:e>
                       <m:sub>
                         <m:r>
-                          <a:rPr lang="en-US" altLang="ko-KR" sz="1200" b="0" i="1" smtClean="0">
+                          <a:rPr lang="en-US" altLang="ko-KR" sz="600" i="1">
                             <a:latin typeface="Cambria Math" panose="02040503050406030204" pitchFamily="18" charset="0"/>
                           </a:rPr>
                           <m:t>h𝑦𝑏𝑟𝑖𝑑</m:t>
@@ -984,7 +984,7 @@
                       </m:sub>
                     </m:sSub>
                     <m:r>
-                      <a:rPr lang="ko-KR" altLang="en-US" sz="1200" i="1" smtClean="0">
+                      <a:rPr lang="ko-KR" altLang="en-US" sz="600" i="1">
                         <a:latin typeface="Cambria Math" panose="02040503050406030204" pitchFamily="18" charset="0"/>
                       </a:rPr>
                       <m:t>로</m:t>
@@ -992,15 +992,15 @@
                   </m:oMath>
                 </a14:m>
                 <a:r>
-                  <a:rPr lang="en-US" altLang="ko-KR" sz="1200" dirty="0" smtClean="0"/>
+                  <a:rPr lang="en-US" altLang="ko-KR" sz="600" dirty="0"/>
                   <a:t> </a:t>
                 </a:r>
                 <a:r>
-                  <a:rPr lang="ko-KR" altLang="en-US" sz="1200" dirty="0" smtClean="0"/>
+                  <a:rPr lang="ko-KR" altLang="en-US" sz="600" dirty="0"/>
                   <a:t>전송할 수 있다면</a:t>
                 </a:r>
                 <a:r>
-                  <a:rPr lang="en-US" altLang="ko-KR" sz="1200" dirty="0" smtClean="0"/>
+                  <a:rPr lang="en-US" altLang="ko-KR" sz="600" dirty="0"/>
                   <a:t>, </a:t>
                 </a:r>
                 <a14:m>
@@ -1008,14 +1008,14 @@
                     <m:sSub>
                       <m:sSubPr>
                         <m:ctrlPr>
-                          <a:rPr lang="en-US" altLang="ko-KR" sz="1200" i="1">
+                          <a:rPr lang="en-US" altLang="ko-KR" sz="600" i="1">
                             <a:latin typeface="Cambria Math" panose="02040503050406030204" pitchFamily="18" charset="0"/>
                           </a:rPr>
                         </m:ctrlPr>
                       </m:sSubPr>
                       <m:e>
                         <m:r>
-                          <a:rPr lang="en-US" altLang="ko-KR" sz="1200" i="1">
+                          <a:rPr lang="en-US" altLang="ko-KR" sz="600" i="1">
                             <a:latin typeface="Cambria Math" panose="02040503050406030204" pitchFamily="18" charset="0"/>
                           </a:rPr>
                           <m:t>𝐼</m:t>
@@ -1023,7 +1023,7 @@
                       </m:e>
                       <m:sub>
                         <m:r>
-                          <a:rPr lang="en-US" altLang="ko-KR" sz="1200" i="1">
+                          <a:rPr lang="en-US" altLang="ko-KR" sz="600" i="1">
                             <a:latin typeface="Cambria Math" panose="02040503050406030204" pitchFamily="18" charset="0"/>
                           </a:rPr>
                           <m:t>2</m:t>
@@ -1033,7 +1033,7 @@
                   </m:oMath>
                 </a14:m>
                 <a:r>
-                  <a:rPr lang="ko-KR" altLang="en-US" sz="1200" dirty="0" smtClean="0"/>
+                  <a:rPr lang="ko-KR" altLang="en-US" sz="600" dirty="0"/>
                   <a:t>의 레이블도 </a:t>
                 </a:r>
                 <a14:m>
@@ -1041,14 +1041,14 @@
                     <m:sSub>
                       <m:sSubPr>
                         <m:ctrlPr>
-                          <a:rPr lang="en-US" altLang="ko-KR" sz="1200" i="1">
+                          <a:rPr lang="en-US" altLang="ko-KR" sz="600" i="1">
                             <a:latin typeface="Cambria Math" panose="02040503050406030204" pitchFamily="18" charset="0"/>
                           </a:rPr>
                         </m:ctrlPr>
                       </m:sSubPr>
                       <m:e>
                         <m:r>
-                          <a:rPr lang="en-US" altLang="ko-KR" sz="1200" i="1">
+                          <a:rPr lang="en-US" altLang="ko-KR" sz="600" i="1">
                             <a:latin typeface="Cambria Math" panose="02040503050406030204" pitchFamily="18" charset="0"/>
                           </a:rPr>
                           <m:t>𝐼</m:t>
@@ -1056,7 +1056,7 @@
                       </m:e>
                       <m:sub>
                         <m:r>
-                          <a:rPr lang="en-US" altLang="ko-KR" sz="1200" b="0" i="1" smtClean="0">
+                          <a:rPr lang="en-US" altLang="ko-KR" sz="600" i="1">
                             <a:latin typeface="Cambria Math" panose="02040503050406030204" pitchFamily="18" charset="0"/>
                           </a:rPr>
                           <m:t>h𝑦𝑏𝑟𝑖𝑑</m:t>
@@ -1066,31 +1066,31 @@
                   </m:oMath>
                 </a14:m>
                 <a:r>
-                  <a:rPr lang="ko-KR" altLang="en-US" sz="1200" dirty="0" smtClean="0"/>
+                  <a:rPr lang="ko-KR" altLang="en-US" sz="600" dirty="0"/>
                   <a:t>로</a:t>
                 </a:r>
                 <a:r>
-                  <a:rPr lang="en-US" altLang="ko-KR" sz="1200" dirty="0" smtClean="0"/>
+                  <a:rPr lang="en-US" altLang="ko-KR" sz="600" dirty="0"/>
                   <a:t> </a:t>
                 </a:r>
                 <a:r>
-                  <a:rPr lang="ko-KR" altLang="en-US" sz="1200" dirty="0" smtClean="0"/>
+                  <a:rPr lang="ko-KR" altLang="en-US" sz="600" dirty="0"/>
                   <a:t>전송되었다고 가정하고</a:t>
                 </a:r>
-                <a:endParaRPr lang="en-US" altLang="ko-KR" sz="1200" dirty="0" smtClean="0"/>
+                <a:endParaRPr lang="en-US" altLang="ko-KR" sz="600" dirty="0"/>
               </a:p>
               <a:p>
-                <a:endParaRPr lang="en-US" altLang="ko-KR" sz="1200" dirty="0"/>
+                <a:endParaRPr lang="en-US" altLang="ko-KR" sz="600" dirty="0"/>
               </a:p>
               <a:p>
                 <a:r>
-                  <a:rPr lang="ko-KR" altLang="en-US" sz="1200" dirty="0" smtClean="0"/>
+                  <a:rPr lang="ko-KR" altLang="en-US" sz="600" dirty="0"/>
                   <a:t>이러한 가정을 기반으로 </a:t>
                 </a:r>
                 <a14:m>
                   <m:oMath xmlns:m="http://schemas.openxmlformats.org/officeDocument/2006/math">
                     <m:r>
-                      <a:rPr lang="en-US" altLang="ko-KR" sz="1200" b="0" i="1" smtClean="0">
+                      <a:rPr lang="en-US" altLang="ko-KR" sz="600" i="1">
                         <a:latin typeface="Cambria Math" panose="02040503050406030204" pitchFamily="18" charset="0"/>
                       </a:rPr>
                       <m:t>𝑡𝑒𝑥𝑡𝑢𝑟𝑒</m:t>
@@ -1098,13 +1098,13 @@
                   </m:oMath>
                 </a14:m>
                 <a:r>
-                  <a:rPr lang="ko-KR" altLang="en-US" sz="1200" dirty="0" smtClean="0"/>
+                  <a:rPr lang="ko-KR" altLang="en-US" sz="600" dirty="0"/>
                   <a:t>가 주어진다면 </a:t>
                 </a:r>
                 <a14:m>
                   <m:oMath xmlns:m="http://schemas.openxmlformats.org/officeDocument/2006/math">
                     <m:r>
-                      <a:rPr lang="en-US" altLang="ko-KR" sz="1200" b="0" i="1" smtClean="0">
+                      <a:rPr lang="en-US" altLang="ko-KR" sz="600" i="1">
                         <a:latin typeface="Cambria Math" panose="02040503050406030204" pitchFamily="18" charset="0"/>
                       </a:rPr>
                       <m:t>𝑠𝑡𝑟𝑢𝑐𝑡𝑢𝑟</m:t>
@@ -1113,7 +1113,7 @@
                       <m:rPr>
                         <m:sty m:val="p"/>
                       </m:rPr>
-                      <a:rPr lang="en-US" altLang="ko-KR" sz="1200" b="0" i="0" smtClean="0">
+                      <a:rPr lang="en-US" altLang="ko-KR" sz="600">
                         <a:latin typeface="Cambria Math" panose="02040503050406030204" pitchFamily="18" charset="0"/>
                       </a:rPr>
                       <m:t>e</m:t>
@@ -1121,27 +1121,23 @@
                   </m:oMath>
                 </a14:m>
                 <a:r>
-                  <a:rPr lang="ko-KR" altLang="en-US" sz="1200" dirty="0" smtClean="0"/>
+                  <a:rPr lang="ko-KR" altLang="en-US" sz="600" dirty="0"/>
                   <a:t>를</a:t>
                 </a:r>
                 <a:r>
-                  <a:rPr lang="en-US" altLang="ko-KR" sz="1200" dirty="0" smtClean="0"/>
+                  <a:rPr lang="en-US" altLang="ko-KR" sz="600" dirty="0"/>
                   <a:t> </a:t>
                 </a:r>
                 <a:r>
-                  <a:rPr lang="ko-KR" altLang="en-US" sz="1200" dirty="0" smtClean="0"/>
-                  <a:t>사용하여</a:t>
+                  <a:rPr lang="ko-KR" altLang="en-US" sz="600" dirty="0"/>
+                  <a:t>사용하여 </a:t>
                 </a:r>
                 <a:r>
-                  <a:rPr lang="ko-KR" altLang="en-US" sz="1200" baseline="0" dirty="0" smtClean="0"/>
-                  <a:t> </a:t>
-                </a:r>
-                <a:r>
-                  <a:rPr lang="en-US" altLang="ko-KR" sz="1200" dirty="0" smtClean="0"/>
+                  <a:rPr lang="en-US" altLang="ko-KR" sz="600" dirty="0"/>
                   <a:t>K</a:t>
                 </a:r>
                 <a:r>
-                  <a:rPr lang="ko-KR" altLang="en-US" sz="1200" dirty="0" smtClean="0"/>
+                  <a:rPr lang="ko-KR" altLang="en-US" sz="600" dirty="0"/>
                   <a:t>개의 </a:t>
                 </a:r>
                 <a14:m>
@@ -1149,14 +1145,14 @@
                     <m:sSub>
                       <m:sSubPr>
                         <m:ctrlPr>
-                          <a:rPr lang="en-US" altLang="ko-KR" sz="1200" i="1">
+                          <a:rPr lang="en-US" altLang="ko-KR" sz="600" i="1">
                             <a:latin typeface="Cambria Math" panose="02040503050406030204" pitchFamily="18" charset="0"/>
                           </a:rPr>
                         </m:ctrlPr>
                       </m:sSubPr>
                       <m:e>
                         <m:r>
-                          <a:rPr lang="en-US" altLang="ko-KR" sz="1200" i="1">
+                          <a:rPr lang="en-US" altLang="ko-KR" sz="600" i="1">
                             <a:latin typeface="Cambria Math" panose="02040503050406030204" pitchFamily="18" charset="0"/>
                           </a:rPr>
                           <m:t>𝐼</m:t>
@@ -1164,7 +1160,7 @@
                       </m:e>
                       <m:sub>
                         <m:r>
-                          <a:rPr lang="en-US" altLang="ko-KR" sz="1200" b="0" i="1" smtClean="0">
+                          <a:rPr lang="en-US" altLang="ko-KR" sz="600" i="1">
                             <a:latin typeface="Cambria Math" panose="02040503050406030204" pitchFamily="18" charset="0"/>
                           </a:rPr>
                           <m:t>h𝑦𝑏𝑟𝑖𝑑</m:t>
@@ -1172,13 +1168,13 @@
                       </m:sub>
                     </m:sSub>
                     <m:r>
-                      <a:rPr lang="en-US" altLang="ko-KR" sz="1200" b="0" i="1" smtClean="0">
+                      <a:rPr lang="en-US" altLang="ko-KR" sz="600" i="1">
                         <a:latin typeface="Cambria Math" panose="02040503050406030204" pitchFamily="18" charset="0"/>
                       </a:rPr>
                       <m:t> </m:t>
                     </m:r>
                     <m:r>
-                      <a:rPr lang="ko-KR" altLang="en-US" sz="1200" i="1" smtClean="0">
+                      <a:rPr lang="ko-KR" altLang="en-US" sz="600" i="1">
                         <a:latin typeface="Cambria Math" panose="02040503050406030204" pitchFamily="18" charset="0"/>
                       </a:rPr>
                       <m:t>이</m:t>
@@ -1186,25 +1182,20 @@
                   </m:oMath>
                 </a14:m>
                 <a:r>
-                  <a:rPr lang="ko-KR" altLang="en-US" sz="1200" dirty="0" smtClean="0"/>
-                  <a:t>미지 생성할</a:t>
+                  <a:rPr lang="ko-KR" altLang="en-US" sz="600" dirty="0"/>
+                  <a:t>미지 생성할 수 있으며</a:t>
                 </a:r>
                 <a:r>
-                  <a:rPr lang="ko-KR" altLang="en-US" sz="1200" baseline="0" dirty="0" smtClean="0"/>
-                  <a:t> 수 있으며</a:t>
-                </a:r>
-                <a:r>
-                  <a:rPr lang="en-US" altLang="ko-KR" sz="1200" baseline="0" dirty="0" smtClean="0"/>
+                  <a:rPr lang="en-US" altLang="ko-KR" sz="600" dirty="0"/>
                   <a:t>,</a:t>
                 </a:r>
-                <a:endParaRPr lang="en-US" altLang="ko-KR" sz="1200" dirty="0" smtClean="0"/>
               </a:p>
               <a:p>
-                <a:endParaRPr lang="en-US" altLang="ko-KR" sz="1200" dirty="0"/>
+                <a:endParaRPr lang="en-US" altLang="ko-KR" sz="600" dirty="0"/>
               </a:p>
               <a:p>
                 <a:r>
-                  <a:rPr lang="ko-KR" altLang="en-US" sz="1200" dirty="0" smtClean="0"/>
+                  <a:rPr lang="ko-KR" altLang="en-US" sz="600" dirty="0"/>
                   <a:t>여기에서 </a:t>
                 </a:r>
                 <a14:m>
@@ -1212,14 +1203,14 @@
                     <m:sSub>
                       <m:sSubPr>
                         <m:ctrlPr>
-                          <a:rPr lang="en-US" altLang="ko-KR" sz="1200" i="1">
+                          <a:rPr lang="en-US" altLang="ko-KR" sz="600" i="1">
                             <a:latin typeface="Cambria Math" panose="02040503050406030204" pitchFamily="18" charset="0"/>
                           </a:rPr>
                         </m:ctrlPr>
                       </m:sSubPr>
                       <m:e>
                         <m:r>
-                          <a:rPr lang="en-US" altLang="ko-KR" sz="1200" i="1">
+                          <a:rPr lang="en-US" altLang="ko-KR" sz="600" i="1">
                             <a:latin typeface="Cambria Math" panose="02040503050406030204" pitchFamily="18" charset="0"/>
                           </a:rPr>
                           <m:t>𝐼</m:t>
@@ -1227,7 +1218,7 @@
                       </m:e>
                       <m:sub>
                         <m:r>
-                          <a:rPr lang="en-US" altLang="ko-KR" sz="1200" i="1">
+                          <a:rPr lang="en-US" altLang="ko-KR" sz="600" i="1">
                             <a:latin typeface="Cambria Math" panose="02040503050406030204" pitchFamily="18" charset="0"/>
                           </a:rPr>
                           <m:t>𝑑𝑠𝑡</m:t>
@@ -1237,23 +1228,23 @@
                   </m:oMath>
                 </a14:m>
                 <a:r>
-                  <a:rPr lang="ko-KR" altLang="en-US" sz="1200" dirty="0" smtClean="0"/>
+                  <a:rPr lang="ko-KR" altLang="en-US" sz="600" dirty="0"/>
                   <a:t>는 코로나 결과</a:t>
                 </a:r>
                 <a:r>
-                  <a:rPr lang="en-US" altLang="ko-KR" sz="1200" dirty="0" smtClean="0"/>
+                  <a:rPr lang="en-US" altLang="ko-KR" sz="600" dirty="0"/>
                   <a:t> </a:t>
                 </a:r>
                 <a:r>
-                  <a:rPr lang="ko-KR" altLang="en-US" sz="1200" dirty="0" err="1" smtClean="0"/>
+                  <a:rPr lang="ko-KR" altLang="en-US" sz="600" dirty="0" err="1"/>
                   <a:t>데이터셋을</a:t>
                 </a:r>
                 <a:r>
-                  <a:rPr lang="ko-KR" altLang="en-US" sz="1200" dirty="0" smtClean="0"/>
+                  <a:rPr lang="ko-KR" altLang="en-US" sz="600" dirty="0"/>
                   <a:t> 사용하였으며</a:t>
                 </a:r>
                 <a:r>
-                  <a:rPr lang="en-US" altLang="ko-KR" sz="1200" dirty="0" smtClean="0"/>
+                  <a:rPr lang="en-US" altLang="ko-KR" sz="600" dirty="0"/>
                   <a:t>, </a:t>
                 </a:r>
                 <a14:m>
@@ -1261,14 +1252,14 @@
                     <m:sSub>
                       <m:sSubPr>
                         <m:ctrlPr>
-                          <a:rPr lang="en-US" altLang="ko-KR" sz="1200" i="1">
+                          <a:rPr lang="en-US" altLang="ko-KR" sz="600" i="1">
                             <a:latin typeface="Cambria Math" panose="02040503050406030204" pitchFamily="18" charset="0"/>
                           </a:rPr>
                         </m:ctrlPr>
                       </m:sSubPr>
                       <m:e>
                         <m:r>
-                          <a:rPr lang="en-US" altLang="ko-KR" sz="1200" i="1">
+                          <a:rPr lang="en-US" altLang="ko-KR" sz="600" i="1">
                             <a:latin typeface="Cambria Math" panose="02040503050406030204" pitchFamily="18" charset="0"/>
                           </a:rPr>
                           <m:t>𝐼</m:t>
@@ -1276,7 +1267,7 @@
                       </m:e>
                       <m:sub>
                         <m:r>
-                          <a:rPr lang="en-US" altLang="ko-KR" sz="1200" b="0" i="1" smtClean="0">
+                          <a:rPr lang="en-US" altLang="ko-KR" sz="600" i="1">
                             <a:latin typeface="Cambria Math" panose="02040503050406030204" pitchFamily="18" charset="0"/>
                           </a:rPr>
                           <m:t>𝑠𝑟𝑐</m:t>
@@ -1286,87 +1277,87 @@
                   </m:oMath>
                 </a14:m>
                 <a:r>
-                  <a:rPr lang="ko-KR" altLang="en-US" sz="1200" dirty="0" smtClean="0"/>
+                  <a:rPr lang="ko-KR" altLang="en-US" sz="600" dirty="0"/>
                   <a:t>는 </a:t>
                 </a:r>
                 <a:r>
-                  <a:rPr lang="en-US" altLang="ko-KR" sz="1200" dirty="0" smtClean="0"/>
+                  <a:rPr lang="en-US" altLang="ko-KR" sz="600" dirty="0"/>
                   <a:t>ChestX-ray14</a:t>
                 </a:r>
                 <a:r>
-                  <a:rPr lang="ko-KR" altLang="en-US" sz="1200" dirty="0" smtClean="0"/>
+                  <a:rPr lang="ko-KR" altLang="en-US" sz="600" dirty="0"/>
                   <a:t>를 사용하였습니다</a:t>
                 </a:r>
                 <a:r>
-                  <a:rPr lang="en-US" altLang="ko-KR" sz="1200" dirty="0" smtClean="0"/>
+                  <a:rPr lang="en-US" altLang="ko-KR" sz="600" dirty="0"/>
                   <a:t>.</a:t>
                 </a:r>
               </a:p>
               <a:p>
-                <a:endParaRPr lang="en-US" altLang="ko-KR" sz="1200" dirty="0"/>
+                <a:endParaRPr lang="en-US" altLang="ko-KR" sz="600" dirty="0"/>
               </a:p>
               <a:p>
                 <a:r>
-                  <a:rPr lang="ko-KR" altLang="en-US" sz="1200" dirty="0" smtClean="0"/>
+                  <a:rPr lang="ko-KR" altLang="en-US" sz="600" dirty="0"/>
                   <a:t>이러한 증강 기법을 사용하여서 훈련 셋을 </a:t>
                 </a:r>
                 <a:r>
-                  <a:rPr lang="en-US" altLang="ko-KR" sz="1200" dirty="0" smtClean="0"/>
+                  <a:rPr lang="en-US" altLang="ko-KR" sz="600" dirty="0"/>
                   <a:t>K</a:t>
                 </a:r>
                 <a:r>
-                  <a:rPr lang="ko-KR" altLang="en-US" sz="1200" dirty="0" smtClean="0"/>
+                  <a:rPr lang="ko-KR" altLang="en-US" sz="600" dirty="0"/>
                   <a:t>배로 확장이 가능하며</a:t>
                 </a:r>
-                <a:endParaRPr lang="en-US" altLang="ko-KR" sz="1200" dirty="0" smtClean="0"/>
+                <a:endParaRPr lang="en-US" altLang="ko-KR" sz="600" dirty="0"/>
               </a:p>
               <a:p>
-                <a:endParaRPr lang="en-US" altLang="ko-KR" sz="1200" dirty="0"/>
+                <a:endParaRPr lang="en-US" altLang="ko-KR" sz="600" dirty="0"/>
               </a:p>
               <a:p>
                 <a:r>
-                  <a:rPr lang="ko-KR" altLang="en-US" sz="1200" dirty="0" smtClean="0"/>
+                  <a:rPr lang="ko-KR" altLang="en-US" sz="600" dirty="0"/>
                   <a:t>해당 증강의 실험 결과는 </a:t>
                 </a:r>
                 <a:r>
-                  <a:rPr lang="en-US" altLang="ko-KR" sz="1200" dirty="0" smtClean="0"/>
+                  <a:rPr lang="en-US" altLang="ko-KR" sz="600" dirty="0"/>
                   <a:t>Table 2</a:t>
                 </a:r>
                 <a:r>
-                  <a:rPr lang="ko-KR" altLang="en-US" sz="1200" dirty="0" smtClean="0"/>
+                  <a:rPr lang="ko-KR" altLang="en-US" sz="600" dirty="0"/>
                   <a:t>에서</a:t>
                 </a:r>
                 <a:r>
-                  <a:rPr lang="en-US" altLang="ko-KR" sz="1200" dirty="0" smtClean="0"/>
+                  <a:rPr lang="en-US" altLang="ko-KR" sz="600" dirty="0"/>
                   <a:t> </a:t>
                 </a:r>
                 <a:r>
-                  <a:rPr lang="ko-KR" altLang="en-US" sz="1200" dirty="0" smtClean="0"/>
+                  <a:rPr lang="ko-KR" altLang="en-US" sz="600" dirty="0"/>
                   <a:t>확인 가능하며</a:t>
                 </a:r>
                 <a:r>
-                  <a:rPr lang="en-US" altLang="ko-KR" sz="1200" dirty="0" smtClean="0"/>
+                  <a:rPr lang="en-US" altLang="ko-KR" sz="600" dirty="0"/>
                   <a:t>, </a:t>
                 </a:r>
                 <a:r>
-                  <a:rPr lang="ko-KR" altLang="en-US" sz="1200" dirty="0" smtClean="0"/>
+                  <a:rPr lang="ko-KR" altLang="en-US" sz="600" dirty="0"/>
                   <a:t>이러한 증강 기법을 통해서</a:t>
                 </a:r>
-                <a:endParaRPr lang="en-US" altLang="ko-KR" sz="1200" dirty="0" smtClean="0"/>
+                <a:endParaRPr lang="en-US" altLang="ko-KR" sz="600" dirty="0"/>
               </a:p>
               <a:p>
-                <a:endParaRPr lang="en-US" altLang="ko-KR" sz="1200" dirty="0" smtClean="0"/>
+                <a:endParaRPr lang="en-US" altLang="ko-KR" sz="600" dirty="0"/>
               </a:p>
               <a:p>
                 <a:r>
-                  <a:rPr lang="ko-KR" altLang="en-US" sz="1200" dirty="0" smtClean="0"/>
+                  <a:rPr lang="ko-KR" altLang="en-US" sz="600" dirty="0"/>
                   <a:t>예측의 정확도를 더욱 향상 시킬 수 있음을 보여주었다고 주장하였습니다</a:t>
                 </a:r>
                 <a:r>
-                  <a:rPr lang="en-US" altLang="ko-KR" sz="1200" dirty="0" smtClean="0"/>
+                  <a:rPr lang="en-US" altLang="ko-KR" sz="600" dirty="0"/>
                   <a:t>.</a:t>
                 </a:r>
-                <a:endParaRPr lang="en-US" altLang="ko-KR" sz="1200" dirty="0"/>
+                <a:endParaRPr lang="en-US" altLang="ko-KR" sz="600" dirty="0"/>
               </a:p>
               <a:p>
                 <a:endParaRPr lang="en-US" altLang="ko-KR" baseline="0" dirty="0" smtClean="0"/>
@@ -1865,8 +1856,8 @@
         </p:nvSpPr>
         <p:spPr>
           <a:xfrm>
-            <a:off x="6281738" y="847725"/>
-            <a:ext cx="7540625" cy="4241800"/>
+            <a:off x="112713" y="744538"/>
+            <a:ext cx="6632575" cy="3730625"/>
           </a:xfrm>
         </p:spPr>
       </p:sp>
@@ -2345,8 +2336,8 @@
         </p:nvSpPr>
         <p:spPr>
           <a:xfrm>
-            <a:off x="6281738" y="847725"/>
-            <a:ext cx="7540625" cy="4241800"/>
+            <a:off x="112713" y="744538"/>
+            <a:ext cx="6632575" cy="3730625"/>
           </a:xfrm>
         </p:spPr>
       </p:sp>
@@ -2384,215 +2375,196 @@
           </a:p>
           <a:p>
             <a:r>
-              <a:rPr lang="ko-KR" altLang="en-US" sz="1200" dirty="0" smtClean="0"/>
+              <a:rPr lang="ko-KR" altLang="en-US" sz="600" dirty="0"/>
               <a:t>생성된 이미지와 기존 이미지의 질병 수준을 파악하기 위해서 </a:t>
             </a:r>
             <a:r>
-              <a:rPr lang="en-US" altLang="ko-KR" sz="1200" dirty="0" smtClean="0"/>
+              <a:rPr lang="en-US" altLang="ko-KR" sz="600" dirty="0"/>
               <a:t>Masked SIFID</a:t>
             </a:r>
             <a:r>
-              <a:rPr lang="ko-KR" altLang="en-US" sz="1200" dirty="0" smtClean="0"/>
+              <a:rPr lang="ko-KR" altLang="en-US" sz="600" dirty="0"/>
               <a:t>를 제안하였으며</a:t>
             </a:r>
             <a:r>
-              <a:rPr lang="en-US" altLang="ko-KR" sz="1200" dirty="0" smtClean="0"/>
+              <a:rPr lang="en-US" altLang="ko-KR" sz="600" dirty="0"/>
+              <a:t>, </a:t>
+            </a:r>
+          </a:p>
+          <a:p>
+            <a:endParaRPr lang="en-US" altLang="ko-KR" sz="600" dirty="0"/>
+          </a:p>
+          <a:p>
+            <a:r>
+              <a:rPr lang="en-US" altLang="ko-KR" sz="600" dirty="0"/>
+              <a:t>Masked SIFID</a:t>
+            </a:r>
+            <a:r>
+              <a:rPr lang="ko-KR" altLang="en-US" sz="600" dirty="0"/>
+              <a:t>는</a:t>
+            </a:r>
+            <a:r>
+              <a:rPr lang="en-US" altLang="ko-KR" sz="600" dirty="0"/>
+              <a:t> </a:t>
+            </a:r>
+            <a:r>
+              <a:rPr lang="ko-KR" altLang="en-US" sz="600" dirty="0"/>
+              <a:t>기존의 </a:t>
+            </a:r>
+            <a:r>
+              <a:rPr lang="en-US" altLang="ko-KR" sz="600" dirty="0"/>
+              <a:t>Inception V3</a:t>
+            </a:r>
+            <a:r>
+              <a:rPr lang="ko-KR" altLang="en-US" sz="600" dirty="0"/>
+              <a:t>를 기반으로 한 </a:t>
+            </a:r>
+            <a:r>
+              <a:rPr lang="en-US" altLang="ko-KR" sz="600" dirty="0"/>
+              <a:t>SIFID</a:t>
+            </a:r>
+            <a:r>
+              <a:rPr lang="ko-KR" altLang="en-US" sz="600" dirty="0"/>
+              <a:t>를 기반으로 하며</a:t>
+            </a:r>
+            <a:r>
+              <a:rPr lang="en-US" altLang="ko-KR" sz="600" dirty="0"/>
+              <a:t>, </a:t>
+            </a:r>
+            <a:r>
+              <a:rPr lang="ko-KR" altLang="en-US" sz="600" dirty="0"/>
+              <a:t>폐 내부 영역의 특징만을 비교합니다</a:t>
+            </a:r>
+            <a:r>
+              <a:rPr lang="en-US" altLang="ko-KR" sz="600" dirty="0"/>
+              <a:t>.</a:t>
+            </a:r>
+          </a:p>
+          <a:p>
+            <a:endParaRPr lang="en-US" altLang="ko-KR" sz="600" dirty="0"/>
+          </a:p>
+          <a:p>
+            <a:r>
+              <a:rPr lang="ko-KR" altLang="en-US" sz="600" dirty="0"/>
+              <a:t>추가적으로 </a:t>
+            </a:r>
+            <a:r>
+              <a:rPr lang="en-US" altLang="ko-KR" sz="600" dirty="0"/>
+              <a:t>5</a:t>
+            </a:r>
+            <a:r>
+              <a:rPr lang="ko-KR" altLang="en-US" sz="600" dirty="0"/>
+              <a:t>명의 흉부 방사선 전문의에게 설문조사를 통해 피드백을 요청하였으며</a:t>
+            </a:r>
+            <a:r>
+              <a:rPr lang="en-US" altLang="ko-KR" sz="600" dirty="0"/>
+              <a:t>, </a:t>
+            </a:r>
+          </a:p>
+          <a:p>
+            <a:endParaRPr lang="en-US" altLang="ko-KR" sz="600" dirty="0"/>
+          </a:p>
+          <a:p>
+            <a:r>
+              <a:rPr lang="en-US" altLang="ko-KR" sz="600" dirty="0"/>
+              <a:t>4</a:t>
+            </a:r>
+            <a:r>
+              <a:rPr lang="ko-KR" altLang="en-US" sz="600" dirty="0"/>
+              <a:t>개의 질문을 통해 생성된 이미지의 평가를 한 결과</a:t>
+            </a:r>
+            <a:endParaRPr lang="en-US" altLang="ko-KR" sz="600" dirty="0"/>
+          </a:p>
+          <a:p>
+            <a:endParaRPr lang="en-US" altLang="ko-KR" sz="600" dirty="0"/>
+          </a:p>
+          <a:p>
+            <a:r>
+              <a:rPr lang="ko-KR" altLang="en-US" sz="600" dirty="0"/>
+              <a:t>생성된 이미지의 </a:t>
+            </a:r>
+            <a:r>
+              <a:rPr lang="en-US" altLang="ko-KR" sz="600" dirty="0"/>
+              <a:t>56%</a:t>
+            </a:r>
+            <a:r>
+              <a:rPr lang="ko-KR" altLang="en-US" sz="600" dirty="0"/>
+              <a:t>를 실제의 이미지로 평가하였고</a:t>
+            </a:r>
+            <a:endParaRPr lang="en-US" altLang="ko-KR" sz="600" dirty="0"/>
+          </a:p>
+          <a:p>
+            <a:endParaRPr lang="en-US" altLang="ko-KR" sz="600" dirty="0"/>
+          </a:p>
+          <a:p>
+            <a:r>
+              <a:rPr lang="ko-KR" altLang="en-US" sz="600" dirty="0" err="1"/>
+              <a:t>하이브리드</a:t>
+            </a:r>
+            <a:r>
+              <a:rPr lang="ko-KR" altLang="en-US" sz="600" dirty="0"/>
+              <a:t> 이미지 패치의 </a:t>
+            </a:r>
+            <a:r>
+              <a:rPr lang="en-US" altLang="ko-KR" sz="600" dirty="0"/>
+              <a:t>76%</a:t>
+            </a:r>
+            <a:r>
+              <a:rPr lang="ko-KR" altLang="en-US" sz="600" dirty="0"/>
+              <a:t>를 실제 이미지로 평가하였습니다</a:t>
+            </a:r>
+            <a:r>
+              <a:rPr lang="en-US" altLang="ko-KR" sz="600" dirty="0"/>
+              <a:t>.</a:t>
+            </a:r>
+          </a:p>
+          <a:p>
+            <a:endParaRPr lang="en-US" altLang="ko-KR" sz="600" dirty="0"/>
+          </a:p>
+          <a:p>
+            <a:r>
+              <a:rPr lang="ko-KR" altLang="en-US" sz="600" dirty="0"/>
+              <a:t>또한 </a:t>
+            </a:r>
+            <a:r>
+              <a:rPr lang="en-US" altLang="ko-KR" sz="600" dirty="0"/>
+              <a:t>Masked SIFID </a:t>
+            </a:r>
+            <a:r>
+              <a:rPr lang="ko-KR" altLang="en-US" sz="600" dirty="0"/>
+              <a:t>방식의 질문을 한 결과 </a:t>
+            </a:r>
+            <a:r>
+              <a:rPr lang="en-US" altLang="ko-KR" sz="600" dirty="0"/>
+              <a:t>78.67%</a:t>
+            </a:r>
+            <a:r>
+              <a:rPr lang="ko-KR" altLang="en-US" sz="600" dirty="0"/>
+              <a:t>가 같은 답변을 하였으며</a:t>
+            </a:r>
+            <a:r>
+              <a:rPr lang="en-US" altLang="ko-KR" sz="600" dirty="0"/>
               <a:t>,</a:t>
             </a:r>
-            <a:r>
-              <a:rPr lang="en-US" altLang="ko-KR" sz="1200" baseline="0" dirty="0" smtClean="0"/>
-              <a:t> </a:t>
-            </a:r>
-            <a:endParaRPr lang="en-US" altLang="ko-KR" sz="1200" dirty="0" smtClean="0"/>
-          </a:p>
-          <a:p>
-            <a:endParaRPr lang="en-US" altLang="ko-KR" sz="1200" dirty="0" smtClean="0"/>
-          </a:p>
-          <a:p>
-            <a:r>
-              <a:rPr lang="en-US" altLang="ko-KR" sz="1200" dirty="0" smtClean="0"/>
-              <a:t>Masked SIFID</a:t>
-            </a:r>
-            <a:r>
-              <a:rPr lang="ko-KR" altLang="en-US" sz="1200" dirty="0" smtClean="0"/>
-              <a:t>는</a:t>
-            </a:r>
-            <a:r>
-              <a:rPr lang="en-US" altLang="ko-KR" sz="1200" dirty="0" smtClean="0"/>
-              <a:t> </a:t>
-            </a:r>
-            <a:r>
-              <a:rPr lang="ko-KR" altLang="en-US" sz="1200" dirty="0" smtClean="0"/>
-              <a:t>기존의 </a:t>
-            </a:r>
-            <a:r>
-              <a:rPr lang="en-US" altLang="ko-KR" sz="1200" dirty="0" smtClean="0"/>
-              <a:t>Inception V3</a:t>
-            </a:r>
-            <a:r>
-              <a:rPr lang="ko-KR" altLang="en-US" sz="1200" dirty="0" smtClean="0"/>
-              <a:t>를 기반으로 한 </a:t>
-            </a:r>
-            <a:r>
-              <a:rPr lang="en-US" altLang="ko-KR" sz="1200" dirty="0" smtClean="0"/>
-              <a:t>SIFID</a:t>
-            </a:r>
-            <a:r>
-              <a:rPr lang="ko-KR" altLang="en-US" sz="1200" dirty="0" smtClean="0"/>
-              <a:t>를 기반으로 하며</a:t>
-            </a:r>
-            <a:r>
-              <a:rPr lang="en-US" altLang="ko-KR" sz="1200" dirty="0" smtClean="0"/>
-              <a:t>,</a:t>
-            </a:r>
-            <a:r>
-              <a:rPr lang="en-US" altLang="ko-KR" sz="1200" baseline="0" dirty="0" smtClean="0"/>
-              <a:t> </a:t>
-            </a:r>
-            <a:r>
-              <a:rPr lang="ko-KR" altLang="en-US" sz="1200" dirty="0" smtClean="0"/>
-              <a:t>폐 내부 영역의 특징만을 비교합니다</a:t>
-            </a:r>
-            <a:r>
-              <a:rPr lang="en-US" altLang="ko-KR" sz="1200" dirty="0" smtClean="0"/>
-              <a:t>.</a:t>
-            </a:r>
-          </a:p>
-          <a:p>
-            <a:endParaRPr lang="en-US" altLang="ko-KR" sz="1200" dirty="0" smtClean="0"/>
-          </a:p>
-          <a:p>
-            <a:r>
-              <a:rPr lang="ko-KR" altLang="en-US" sz="1200" dirty="0" smtClean="0"/>
-              <a:t>추가적으로 </a:t>
-            </a:r>
-            <a:r>
-              <a:rPr lang="en-US" altLang="ko-KR" sz="1200" dirty="0" smtClean="0"/>
-              <a:t>5</a:t>
-            </a:r>
-            <a:r>
-              <a:rPr lang="ko-KR" altLang="en-US" sz="1200" dirty="0" smtClean="0"/>
-              <a:t>명의 흉부 방사선 전문의에게 설문조사를 통해 피드백을 요청하였으며</a:t>
-            </a:r>
-            <a:r>
-              <a:rPr lang="en-US" altLang="ko-KR" sz="1200" dirty="0" smtClean="0"/>
-              <a:t>,</a:t>
-            </a:r>
-            <a:r>
-              <a:rPr lang="en-US" altLang="ko-KR" sz="1200" baseline="0" dirty="0" smtClean="0"/>
-              <a:t> </a:t>
-            </a:r>
-            <a:endParaRPr lang="en-US" altLang="ko-KR" sz="1200" dirty="0" smtClean="0"/>
-          </a:p>
-          <a:p>
-            <a:endParaRPr lang="en-US" altLang="ko-KR" sz="1200" dirty="0" smtClean="0"/>
-          </a:p>
-          <a:p>
-            <a:r>
-              <a:rPr lang="en-US" altLang="ko-KR" sz="1200" dirty="0" smtClean="0"/>
-              <a:t>4</a:t>
-            </a:r>
-            <a:r>
-              <a:rPr lang="ko-KR" altLang="en-US" sz="1200" dirty="0" smtClean="0"/>
-              <a:t>개의 질문을 통해 생성된 이미지의 평가를 한 결과</a:t>
-            </a:r>
-            <a:endParaRPr lang="en-US" altLang="ko-KR" sz="1200" dirty="0" smtClean="0"/>
-          </a:p>
-          <a:p>
-            <a:endParaRPr lang="en-US" altLang="ko-KR" sz="1200" dirty="0" smtClean="0"/>
-          </a:p>
-          <a:p>
-            <a:r>
-              <a:rPr lang="ko-KR" altLang="en-US" sz="1200" dirty="0" smtClean="0"/>
-              <a:t>생성된 이미지의 </a:t>
-            </a:r>
-            <a:r>
-              <a:rPr lang="en-US" altLang="ko-KR" sz="1200" dirty="0" smtClean="0"/>
-              <a:t>56%</a:t>
-            </a:r>
-            <a:r>
-              <a:rPr lang="ko-KR" altLang="en-US" sz="1200" dirty="0" smtClean="0"/>
-              <a:t>를 실제의 이미지로 평가하였고</a:t>
-            </a:r>
-            <a:endParaRPr lang="en-US" altLang="ko-KR" sz="1200" dirty="0" smtClean="0"/>
-          </a:p>
-          <a:p>
-            <a:endParaRPr lang="en-US" altLang="ko-KR" sz="1200" dirty="0" smtClean="0"/>
-          </a:p>
-          <a:p>
-            <a:r>
-              <a:rPr lang="ko-KR" altLang="en-US" sz="1200" dirty="0" err="1" smtClean="0"/>
-              <a:t>하이브리드</a:t>
-            </a:r>
-            <a:r>
-              <a:rPr lang="ko-KR" altLang="en-US" sz="1200" dirty="0" smtClean="0"/>
-              <a:t> 이미지 패치의 </a:t>
-            </a:r>
-            <a:r>
-              <a:rPr lang="en-US" altLang="ko-KR" sz="1200" dirty="0" smtClean="0"/>
-              <a:t>76%</a:t>
-            </a:r>
-            <a:r>
-              <a:rPr lang="ko-KR" altLang="en-US" sz="1200" dirty="0" smtClean="0"/>
-              <a:t>를 실제 이미지로 평가하였습니다</a:t>
-            </a:r>
-            <a:r>
-              <a:rPr lang="en-US" altLang="ko-KR" sz="1200" dirty="0" smtClean="0"/>
-              <a:t>.</a:t>
-            </a:r>
-            <a:endParaRPr lang="en-US" altLang="ko-KR" sz="1200" baseline="0" dirty="0" smtClean="0"/>
-          </a:p>
-          <a:p>
-            <a:endParaRPr lang="en-US" altLang="ko-KR" sz="1200" dirty="0" smtClean="0"/>
-          </a:p>
-          <a:p>
-            <a:r>
-              <a:rPr lang="ko-KR" altLang="en-US" sz="1200" dirty="0" smtClean="0"/>
-              <a:t>또한 </a:t>
-            </a:r>
-            <a:r>
-              <a:rPr lang="en-US" altLang="ko-KR" sz="1200" dirty="0" smtClean="0"/>
-              <a:t>Masked SIFID </a:t>
-            </a:r>
-            <a:r>
-              <a:rPr lang="ko-KR" altLang="en-US" sz="1200" dirty="0" smtClean="0"/>
-              <a:t>방식의 질문을 한 결과 </a:t>
-            </a:r>
-            <a:r>
-              <a:rPr lang="en-US" altLang="ko-KR" sz="1200" dirty="0" smtClean="0"/>
-              <a:t>78.67%</a:t>
-            </a:r>
-            <a:r>
-              <a:rPr lang="ko-KR" altLang="en-US" sz="1200" dirty="0" smtClean="0"/>
-              <a:t>가 같은 답변을 하였으며</a:t>
-            </a:r>
-            <a:r>
-              <a:rPr lang="en-US" altLang="ko-KR" sz="1200" dirty="0" smtClean="0"/>
-              <a:t>,</a:t>
-            </a:r>
-          </a:p>
-          <a:p>
-            <a:endParaRPr lang="en-US" altLang="ko-KR" sz="1200" dirty="0" smtClean="0"/>
-          </a:p>
-          <a:p>
-            <a:r>
-              <a:rPr lang="ko-KR" altLang="en-US" sz="1200" dirty="0" smtClean="0"/>
+          </a:p>
+          <a:p>
+            <a:endParaRPr lang="en-US" altLang="ko-KR" sz="600" dirty="0"/>
+          </a:p>
+          <a:p>
+            <a:r>
+              <a:rPr lang="ko-KR" altLang="en-US" sz="600" dirty="0"/>
               <a:t>마지막 질문으로 동일한 질감을 가진 원본 이미지와 생성된 이미지를 보여주었을 때</a:t>
             </a:r>
             <a:r>
-              <a:rPr lang="en-US" altLang="ko-KR" sz="1200" baseline="0" dirty="0" smtClean="0"/>
-              <a:t> </a:t>
-            </a:r>
-            <a:r>
-              <a:rPr lang="en-US" altLang="ko-KR" sz="1200" dirty="0" smtClean="0"/>
-              <a:t>60%</a:t>
-            </a:r>
-            <a:r>
-              <a:rPr lang="ko-KR" altLang="en-US" sz="1200" dirty="0" smtClean="0"/>
+              <a:rPr lang="en-US" altLang="ko-KR" sz="600" dirty="0"/>
+              <a:t> 60%</a:t>
+            </a:r>
+            <a:r>
+              <a:rPr lang="ko-KR" altLang="en-US" sz="600" dirty="0"/>
               <a:t>가 테스트를 통과하였다고 주장합니다</a:t>
             </a:r>
             <a:r>
-              <a:rPr lang="en-US" altLang="ko-KR" sz="1200" dirty="0" smtClean="0"/>
+              <a:rPr lang="en-US" altLang="ko-KR" sz="600" dirty="0"/>
               <a:t>.</a:t>
             </a:r>
           </a:p>
@@ -2672,8 +2644,8 @@
         </p:nvSpPr>
         <p:spPr>
           <a:xfrm>
-            <a:off x="6281738" y="847725"/>
-            <a:ext cx="7540625" cy="4241800"/>
+            <a:off x="112713" y="744538"/>
+            <a:ext cx="6632575" cy="3730625"/>
           </a:xfrm>
         </p:spPr>
       </p:sp>
@@ -2926,8 +2898,8 @@
         </p:nvSpPr>
         <p:spPr>
           <a:xfrm>
-            <a:off x="6281738" y="847725"/>
-            <a:ext cx="7540625" cy="4241800"/>
+            <a:off x="112713" y="744538"/>
+            <a:ext cx="6632575" cy="3730625"/>
           </a:xfrm>
         </p:spPr>
       </p:sp>
@@ -3135,8 +3107,8 @@
         </p:nvSpPr>
         <p:spPr>
           <a:xfrm>
-            <a:off x="6281738" y="847725"/>
-            <a:ext cx="7540625" cy="4241800"/>
+            <a:off x="112713" y="744538"/>
+            <a:ext cx="6632575" cy="3730625"/>
           </a:xfrm>
         </p:spPr>
       </p:sp>
@@ -3174,109 +3146,95 @@
           </a:p>
           <a:p>
             <a:r>
-              <a:rPr lang="ko-KR" altLang="en-US" sz="1200" dirty="0" smtClean="0"/>
+              <a:rPr lang="ko-KR" altLang="en-US" sz="600" dirty="0"/>
               <a:t>해당 저자는 </a:t>
             </a:r>
             <a:r>
-              <a:rPr lang="en-US" altLang="ko-KR" sz="1200" dirty="0" smtClean="0"/>
+              <a:rPr lang="en-US" altLang="ko-KR" sz="600" dirty="0"/>
               <a:t>LSAE</a:t>
             </a:r>
             <a:r>
-              <a:rPr lang="ko-KR" altLang="en-US" sz="1200" dirty="0" smtClean="0"/>
+              <a:rPr lang="ko-KR" altLang="en-US" sz="600" dirty="0"/>
               <a:t>를 통해서 구조와 질감을 분리하여</a:t>
             </a:r>
             <a:r>
-              <a:rPr lang="en-US" altLang="ko-KR" sz="1200" dirty="0" smtClean="0"/>
+              <a:rPr lang="en-US" altLang="ko-KR" sz="600" dirty="0"/>
               <a:t>, </a:t>
             </a:r>
             <a:r>
-              <a:rPr lang="ko-KR" altLang="en-US" sz="1200" dirty="0" smtClean="0"/>
+              <a:rPr lang="ko-KR" altLang="en-US" sz="600" dirty="0"/>
               <a:t>코로나</a:t>
             </a:r>
             <a:r>
-              <a:rPr lang="en-US" altLang="ko-KR" sz="1200" dirty="0" smtClean="0"/>
+              <a:rPr lang="en-US" altLang="ko-KR" sz="600" dirty="0"/>
               <a:t> </a:t>
             </a:r>
             <a:r>
-              <a:rPr lang="ko-KR" altLang="en-US" sz="1200" dirty="0" smtClean="0"/>
+              <a:rPr lang="ko-KR" altLang="en-US" sz="600" dirty="0"/>
               <a:t>및 기타 질병 관련 조직 변화를 분석할 수 있으며</a:t>
             </a:r>
             <a:r>
-              <a:rPr lang="en-US" altLang="ko-KR" sz="1200" dirty="0" smtClean="0"/>
+              <a:rPr lang="en-US" altLang="ko-KR" sz="600" dirty="0"/>
               <a:t>,</a:t>
             </a:r>
           </a:p>
           <a:p>
-            <a:endParaRPr lang="en-US" altLang="ko-KR" sz="1200" dirty="0" smtClean="0"/>
-          </a:p>
-          <a:p>
-            <a:r>
-              <a:rPr lang="ko-KR" altLang="en-US" sz="1200" dirty="0" smtClean="0"/>
-              <a:t>이렇게 분리된 구조와 질감을 통해서 효과적인 흉부 방사선</a:t>
-            </a:r>
-            <a:r>
-              <a:rPr lang="ko-KR" altLang="en-US" sz="1200" baseline="0" dirty="0" smtClean="0"/>
+            <a:endParaRPr lang="en-US" altLang="ko-KR" sz="600" dirty="0"/>
+          </a:p>
+          <a:p>
+            <a:r>
+              <a:rPr lang="ko-KR" altLang="en-US" sz="600" dirty="0"/>
+              <a:t>이렇게 분리된 구조와 질감을 통해서 효과적인 흉부 방사선 데이터 증강을 할 수 있으며</a:t>
+            </a:r>
+            <a:r>
+              <a:rPr lang="en-US" altLang="ko-KR" sz="600" dirty="0"/>
+              <a:t>, </a:t>
+            </a:r>
+          </a:p>
+          <a:p>
+            <a:endParaRPr lang="en-US" altLang="ko-KR" sz="600" dirty="0"/>
+          </a:p>
+          <a:p>
+            <a:r>
+              <a:rPr lang="ko-KR" altLang="en-US" sz="600" dirty="0"/>
+              <a:t>이러한 방법을 통해서 기존의 코로나</a:t>
+            </a:r>
+            <a:r>
+              <a:rPr lang="en-US" altLang="ko-KR" sz="600" dirty="0"/>
               <a:t> </a:t>
             </a:r>
             <a:r>
-              <a:rPr lang="ko-KR" altLang="en-US" sz="1200" dirty="0" smtClean="0"/>
-              <a:t>데이터 증강을 할 수 있으며</a:t>
-            </a:r>
-            <a:r>
-              <a:rPr lang="en-US" altLang="ko-KR" sz="1200" dirty="0" smtClean="0"/>
-              <a:t>,</a:t>
-            </a:r>
-            <a:r>
-              <a:rPr lang="en-US" altLang="ko-KR" sz="1200" baseline="0" dirty="0" smtClean="0"/>
-              <a:t> </a:t>
-            </a:r>
-            <a:endParaRPr lang="en-US" altLang="ko-KR" sz="1200" dirty="0" smtClean="0"/>
-          </a:p>
-          <a:p>
-            <a:endParaRPr lang="en-US" altLang="ko-KR" sz="1200" dirty="0" smtClean="0"/>
-          </a:p>
-          <a:p>
-            <a:r>
-              <a:rPr lang="ko-KR" altLang="en-US" sz="1200" dirty="0" smtClean="0"/>
-              <a:t>이러한 방법을 통해서 기존의 코로나</a:t>
-            </a:r>
-            <a:r>
-              <a:rPr lang="en-US" altLang="ko-KR" sz="1200" dirty="0" smtClean="0"/>
-              <a:t> </a:t>
-            </a:r>
-            <a:r>
-              <a:rPr lang="ko-KR" altLang="en-US" sz="1200" dirty="0" smtClean="0"/>
+              <a:rPr lang="ko-KR" altLang="en-US" sz="600" dirty="0"/>
               <a:t>예측 모델의 성능을 능가하며</a:t>
             </a:r>
             <a:r>
-              <a:rPr lang="en-US" altLang="ko-KR" sz="1200" dirty="0" smtClean="0"/>
+              <a:rPr lang="en-US" altLang="ko-KR" sz="600" dirty="0"/>
               <a:t>, </a:t>
             </a:r>
             <a:r>
-              <a:rPr lang="ko-KR" altLang="en-US" sz="1200" dirty="0" smtClean="0"/>
+              <a:rPr lang="ko-KR" altLang="en-US" sz="600" dirty="0"/>
               <a:t>개선된 의사 결정을 가능케하였다</a:t>
             </a:r>
             <a:r>
-              <a:rPr lang="en-US" altLang="ko-KR" sz="1200" dirty="0" smtClean="0"/>
+              <a:rPr lang="en-US" altLang="ko-KR" sz="600" dirty="0"/>
               <a:t>.</a:t>
             </a:r>
           </a:p>
           <a:p>
-            <a:endParaRPr lang="en-US" altLang="ko-KR" sz="1200" dirty="0" smtClean="0"/>
-          </a:p>
-          <a:p>
-            <a:r>
-              <a:rPr lang="ko-KR" altLang="en-US" sz="1200" dirty="0" smtClean="0"/>
+            <a:endParaRPr lang="en-US" altLang="ko-KR" sz="600" dirty="0"/>
+          </a:p>
+          <a:p>
+            <a:r>
+              <a:rPr lang="ko-KR" altLang="en-US" sz="600" dirty="0"/>
               <a:t>추후에는 코로나 외 다른 질병에 적용할 예정이라고 합니다</a:t>
             </a:r>
             <a:r>
-              <a:rPr lang="en-US" altLang="ko-KR" sz="1200" dirty="0" smtClean="0"/>
+              <a:rPr lang="en-US" altLang="ko-KR" sz="600" dirty="0"/>
               <a:t>.</a:t>
             </a:r>
-            <a:endParaRPr lang="en-US" altLang="ko-KR" sz="1200" baseline="0" dirty="0" smtClean="0"/>
-          </a:p>
-          <a:p>
-            <a:endParaRPr lang="en-US" altLang="ko-KR" sz="1200" baseline="0" dirty="0" smtClean="0"/>
+          </a:p>
+          <a:p>
+            <a:endParaRPr lang="en-US" altLang="ko-KR" sz="600" dirty="0"/>
           </a:p>
         </p:txBody>
       </p:sp>
@@ -3461,8 +3419,8 @@
         </p:nvSpPr>
         <p:spPr>
           <a:xfrm>
-            <a:off x="6281738" y="847725"/>
-            <a:ext cx="7540625" cy="4241800"/>
+            <a:off x="112713" y="744538"/>
+            <a:ext cx="6632575" cy="3730625"/>
           </a:xfrm>
         </p:spPr>
       </p:sp>
@@ -3564,8 +3522,8 @@
         </p:nvSpPr>
         <p:spPr>
           <a:xfrm>
-            <a:off x="6281738" y="847725"/>
-            <a:ext cx="7540625" cy="4241800"/>
+            <a:off x="112713" y="744538"/>
+            <a:ext cx="6632575" cy="3730625"/>
           </a:xfrm>
         </p:spPr>
       </p:sp>
@@ -3714,8 +3672,8 @@
         </p:nvSpPr>
         <p:spPr>
           <a:xfrm>
-            <a:off x="6281738" y="847725"/>
-            <a:ext cx="7540625" cy="4241800"/>
+            <a:off x="112713" y="744538"/>
+            <a:ext cx="6632575" cy="3730625"/>
           </a:xfrm>
         </p:spPr>
       </p:sp>
@@ -3949,8 +3907,8 @@
         </p:nvSpPr>
         <p:spPr>
           <a:xfrm>
-            <a:off x="6281738" y="847725"/>
-            <a:ext cx="7540625" cy="4241800"/>
+            <a:off x="112713" y="744538"/>
+            <a:ext cx="6632575" cy="3730625"/>
           </a:xfrm>
         </p:spPr>
       </p:sp>
@@ -4171,8 +4129,8 @@
         </p:nvSpPr>
         <p:spPr>
           <a:xfrm>
-            <a:off x="6281738" y="847725"/>
-            <a:ext cx="7540625" cy="4241800"/>
+            <a:off x="112713" y="744538"/>
+            <a:ext cx="6632575" cy="3730625"/>
           </a:xfrm>
         </p:spPr>
       </p:sp>
@@ -4400,8 +4358,8 @@
         </p:nvSpPr>
         <p:spPr>
           <a:xfrm>
-            <a:off x="6281738" y="847725"/>
-            <a:ext cx="7540625" cy="4241800"/>
+            <a:off x="112713" y="744538"/>
+            <a:ext cx="6632575" cy="3730625"/>
           </a:xfrm>
         </p:spPr>
       </p:sp>
@@ -4637,8 +4595,8 @@
         </p:nvSpPr>
         <p:spPr>
           <a:xfrm>
-            <a:off x="6281738" y="847725"/>
-            <a:ext cx="7540625" cy="4241800"/>
+            <a:off x="112713" y="744538"/>
+            <a:ext cx="6632575" cy="3730625"/>
           </a:xfrm>
         </p:spPr>
       </p:sp>
@@ -4804,21 +4762,7 @@
             <a:endParaRPr lang="en-US" altLang="ko-KR" baseline="0" dirty="0" smtClean="0"/>
           </a:p>
           <a:p>
-            <a:pPr marL="0" marR="0" indent="0" algn="l" defTabSz="914400" rtl="0" eaLnBrk="1" fontAlgn="auto" latinLnBrk="1" hangingPunct="1">
-              <a:lnSpc>
-                <a:spcPct val="100000"/>
-              </a:lnSpc>
-              <a:spcBef>
-                <a:spcPts val="0"/>
-              </a:spcBef>
-              <a:spcAft>
-                <a:spcPts val="0"/>
-              </a:spcAft>
-              <a:buClrTx/>
-              <a:buSzTx/>
-              <a:buFontTx/>
-              <a:buNone/>
-              <a:tabLst/>
+            <a:pPr defTabSz="489113">
               <a:defRPr/>
             </a:pPr>
             <a:r>
@@ -4844,41 +4788,13 @@
             <a:endParaRPr lang="en-US" altLang="ko-KR" baseline="0" dirty="0" smtClean="0"/>
           </a:p>
           <a:p>
-            <a:pPr marL="0" marR="0" indent="0" algn="l" defTabSz="914400" rtl="0" eaLnBrk="1" fontAlgn="auto" latinLnBrk="1" hangingPunct="1">
-              <a:lnSpc>
-                <a:spcPct val="100000"/>
-              </a:lnSpc>
-              <a:spcBef>
-                <a:spcPts val="0"/>
-              </a:spcBef>
-              <a:spcAft>
-                <a:spcPts val="0"/>
-              </a:spcAft>
-              <a:buClrTx/>
-              <a:buSzTx/>
-              <a:buFontTx/>
-              <a:buNone/>
-              <a:tabLst/>
+            <a:pPr defTabSz="489113">
               <a:defRPr/>
             </a:pPr>
             <a:endParaRPr lang="en-US" altLang="ko-KR" baseline="0" dirty="0" smtClean="0"/>
           </a:p>
           <a:p>
-            <a:pPr marL="0" marR="0" indent="0" algn="l" defTabSz="914400" rtl="0" eaLnBrk="1" fontAlgn="auto" latinLnBrk="1" hangingPunct="1">
-              <a:lnSpc>
-                <a:spcPct val="100000"/>
-              </a:lnSpc>
-              <a:spcBef>
-                <a:spcPts val="0"/>
-              </a:spcBef>
-              <a:spcAft>
-                <a:spcPts val="0"/>
-              </a:spcAft>
-              <a:buClrTx/>
-              <a:buSzTx/>
-              <a:buFontTx/>
-              <a:buNone/>
-              <a:tabLst/>
+            <a:pPr defTabSz="489113">
               <a:defRPr/>
             </a:pPr>
             <a:endParaRPr lang="en-US" altLang="ko-KR" baseline="0" dirty="0" smtClean="0"/>
@@ -4962,8 +4878,8 @@
         </p:nvSpPr>
         <p:spPr>
           <a:xfrm>
-            <a:off x="6281738" y="847725"/>
-            <a:ext cx="7540625" cy="4241800"/>
+            <a:off x="112713" y="744538"/>
+            <a:ext cx="6632575" cy="3730625"/>
           </a:xfrm>
         </p:spPr>
       </p:sp>
@@ -5276,6 +5192,36 @@
               <a:rPr lang="en-US" altLang="ko-KR" baseline="0" dirty="0" smtClean="0"/>
               <a:t>.</a:t>
             </a:r>
+          </a:p>
+          <a:p>
+            <a:endParaRPr lang="en-US" altLang="ko-KR" baseline="0" dirty="0" smtClean="0"/>
+          </a:p>
+          <a:p>
+            <a:r>
+              <a:rPr lang="ko-KR" altLang="en-US" baseline="0" dirty="0" smtClean="0"/>
+              <a:t>오른쪽 제일 상단을 보시면 </a:t>
+            </a:r>
+            <a:r>
+              <a:rPr lang="en-US" altLang="ko-KR" baseline="0" dirty="0" smtClean="0"/>
+              <a:t>LNCE</a:t>
+            </a:r>
+            <a:r>
+              <a:rPr lang="ko-KR" altLang="en-US" baseline="0" dirty="0" smtClean="0"/>
+              <a:t>를 보시면 </a:t>
+            </a:r>
+            <a:r>
+              <a:rPr lang="en-US" altLang="ko-KR" baseline="0" dirty="0" smtClean="0"/>
+              <a:t>n</a:t>
+            </a:r>
+            <a:r>
+              <a:rPr lang="ko-KR" altLang="en-US" baseline="0" dirty="0" smtClean="0"/>
+              <a:t>개로 구분되는 문제를 대상으로 한 교차 엔트로피 함수를 나타내고 있으며</a:t>
+            </a:r>
+            <a:r>
+              <a:rPr lang="en-US" altLang="ko-KR" baseline="0" dirty="0" smtClean="0"/>
+              <a:t>,</a:t>
+            </a:r>
+            <a:endParaRPr lang="en-US" altLang="ko-KR" baseline="0" dirty="0" smtClean="0"/>
           </a:p>
           <a:p>
             <a:endParaRPr lang="en-US" altLang="ko-KR" baseline="0" dirty="0" smtClean="0"/>
@@ -7136,7 +7082,7 @@
     <mc:Choice Requires="p14">
       <p:transition/>
     </mc:Choice>
-    <mc:Fallback xmlns="" xmlns:c="http://schemas.openxmlformats.org/drawingml/2006/chart" xmlns:dgm="http://schemas.openxmlformats.org/drawingml/2006/diagram" xmlns:dsp="http://schemas.microsoft.com/office/drawing/2008/diagram">
+    <mc:Fallback xmlns:dsp="http://schemas.microsoft.com/office/drawing/2008/diagram" xmlns:dgm="http://schemas.openxmlformats.org/drawingml/2006/diagram" xmlns:c="http://schemas.openxmlformats.org/drawingml/2006/chart" xmlns="">
       <p:transition/>
     </mc:Fallback>
   </mc:AlternateContent>
@@ -8042,7 +7988,7 @@
     <mc:Choice Requires="p14">
       <p:transition/>
     </mc:Choice>
-    <mc:Fallback xmlns="" xmlns:c="http://schemas.openxmlformats.org/drawingml/2006/chart" xmlns:dgm="http://schemas.openxmlformats.org/drawingml/2006/diagram" xmlns:dsp="http://schemas.microsoft.com/office/drawing/2008/diagram">
+    <mc:Fallback xmlns:dsp="http://schemas.microsoft.com/office/drawing/2008/diagram" xmlns:dgm="http://schemas.openxmlformats.org/drawingml/2006/diagram" xmlns:c="http://schemas.openxmlformats.org/drawingml/2006/chart" xmlns="">
       <p:transition/>
     </mc:Fallback>
   </mc:AlternateContent>
@@ -8838,7 +8784,7 @@
     <mc:Choice Requires="p14">
       <p:transition/>
     </mc:Choice>
-    <mc:Fallback xmlns="" xmlns:c="http://schemas.openxmlformats.org/drawingml/2006/chart" xmlns:dgm="http://schemas.openxmlformats.org/drawingml/2006/diagram" xmlns:dsp="http://schemas.microsoft.com/office/drawing/2008/diagram">
+    <mc:Fallback xmlns:dsp="http://schemas.microsoft.com/office/drawing/2008/diagram" xmlns:dgm="http://schemas.openxmlformats.org/drawingml/2006/diagram" xmlns:c="http://schemas.openxmlformats.org/drawingml/2006/chart" xmlns="">
       <p:transition/>
     </mc:Fallback>
   </mc:AlternateContent>
@@ -10494,7 +10440,7 @@
     <mc:Choice Requires="p14">
       <p:transition/>
     </mc:Choice>
-    <mc:Fallback xmlns="" xmlns:c="http://schemas.openxmlformats.org/drawingml/2006/chart" xmlns:dgm="http://schemas.openxmlformats.org/drawingml/2006/diagram" xmlns:dsp="http://schemas.microsoft.com/office/drawing/2008/diagram">
+    <mc:Fallback xmlns:dsp="http://schemas.microsoft.com/office/drawing/2008/diagram" xmlns:dgm="http://schemas.openxmlformats.org/drawingml/2006/diagram" xmlns:c="http://schemas.openxmlformats.org/drawingml/2006/chart" xmlns="">
       <p:transition/>
     </mc:Fallback>
   </mc:AlternateContent>
@@ -10906,7 +10852,7 @@
     <mc:Choice Requires="p14">
       <p:transition/>
     </mc:Choice>
-    <mc:Fallback xmlns="" xmlns:c="http://schemas.openxmlformats.org/drawingml/2006/chart" xmlns:dgm="http://schemas.openxmlformats.org/drawingml/2006/diagram" xmlns:dsp="http://schemas.microsoft.com/office/drawing/2008/diagram">
+    <mc:Fallback xmlns:dsp="http://schemas.microsoft.com/office/drawing/2008/diagram" xmlns:dgm="http://schemas.openxmlformats.org/drawingml/2006/diagram" xmlns:c="http://schemas.openxmlformats.org/drawingml/2006/chart" xmlns="">
       <p:transition/>
     </mc:Fallback>
   </mc:AlternateContent>
@@ -11219,7 +11165,7 @@
     <mc:Choice Requires="p14">
       <p:transition/>
     </mc:Choice>
-    <mc:Fallback xmlns="" xmlns:c="http://schemas.openxmlformats.org/drawingml/2006/chart" xmlns:dgm="http://schemas.openxmlformats.org/drawingml/2006/diagram" xmlns:dsp="http://schemas.microsoft.com/office/drawing/2008/diagram">
+    <mc:Fallback xmlns:dsp="http://schemas.microsoft.com/office/drawing/2008/diagram" xmlns:dgm="http://schemas.openxmlformats.org/drawingml/2006/diagram" xmlns:c="http://schemas.openxmlformats.org/drawingml/2006/chart" xmlns="">
       <p:transition/>
     </mc:Fallback>
   </mc:AlternateContent>
@@ -13677,7 +13623,7 @@
     <mc:Choice Requires="p14">
       <p:transition/>
     </mc:Choice>
-    <mc:Fallback xmlns="" xmlns:c="http://schemas.openxmlformats.org/drawingml/2006/chart" xmlns:dgm="http://schemas.openxmlformats.org/drawingml/2006/diagram" xmlns:dsp="http://schemas.microsoft.com/office/drawing/2008/diagram">
+    <mc:Fallback xmlns:dsp="http://schemas.microsoft.com/office/drawing/2008/diagram" xmlns:dgm="http://schemas.openxmlformats.org/drawingml/2006/diagram" xmlns:c="http://schemas.openxmlformats.org/drawingml/2006/chart" xmlns="">
       <p:transition/>
     </mc:Fallback>
   </mc:AlternateContent>
@@ -13953,7 +13899,7 @@
     <mc:Choice Requires="p14">
       <p:transition/>
     </mc:Choice>
-    <mc:Fallback xmlns="" xmlns:c="http://schemas.openxmlformats.org/drawingml/2006/chart" xmlns:dgm="http://schemas.openxmlformats.org/drawingml/2006/diagram" xmlns:dsp="http://schemas.microsoft.com/office/drawing/2008/diagram">
+    <mc:Fallback xmlns:dsp="http://schemas.microsoft.com/office/drawing/2008/diagram" xmlns:dgm="http://schemas.openxmlformats.org/drawingml/2006/diagram" xmlns:c="http://schemas.openxmlformats.org/drawingml/2006/chart" xmlns="">
       <p:transition/>
     </mc:Fallback>
   </mc:AlternateContent>
@@ -14151,7 +14097,7 @@
     <mc:Choice Requires="p14">
       <p:transition/>
     </mc:Choice>
-    <mc:Fallback xmlns="" xmlns:c="http://schemas.openxmlformats.org/drawingml/2006/chart" xmlns:dgm="http://schemas.openxmlformats.org/drawingml/2006/diagram" xmlns:dsp="http://schemas.microsoft.com/office/drawing/2008/diagram">
+    <mc:Fallback xmlns:dsp="http://schemas.microsoft.com/office/drawing/2008/diagram" xmlns:dgm="http://schemas.openxmlformats.org/drawingml/2006/diagram" xmlns:c="http://schemas.openxmlformats.org/drawingml/2006/chart" xmlns="">
       <p:transition/>
     </mc:Fallback>
   </mc:AlternateContent>
@@ -14399,7 +14345,7 @@
     <mc:Choice Requires="p14">
       <p:transition/>
     </mc:Choice>
-    <mc:Fallback xmlns="" xmlns:c="http://schemas.openxmlformats.org/drawingml/2006/chart" xmlns:dgm="http://schemas.openxmlformats.org/drawingml/2006/diagram" xmlns:dsp="http://schemas.microsoft.com/office/drawing/2008/diagram">
+    <mc:Fallback xmlns:dsp="http://schemas.microsoft.com/office/drawing/2008/diagram" xmlns:dgm="http://schemas.openxmlformats.org/drawingml/2006/diagram" xmlns:c="http://schemas.openxmlformats.org/drawingml/2006/chart" xmlns="">
       <p:transition/>
     </mc:Fallback>
   </mc:AlternateContent>
@@ -14760,7 +14706,7 @@
     <mc:Choice Requires="p14">
       <p:transition/>
     </mc:Choice>
-    <mc:Fallback xmlns="" xmlns:c="http://schemas.openxmlformats.org/drawingml/2006/chart" xmlns:dgm="http://schemas.openxmlformats.org/drawingml/2006/diagram" xmlns:dsp="http://schemas.microsoft.com/office/drawing/2008/diagram">
+    <mc:Fallback xmlns:dsp="http://schemas.microsoft.com/office/drawing/2008/diagram" xmlns:dgm="http://schemas.openxmlformats.org/drawingml/2006/diagram" xmlns:c="http://schemas.openxmlformats.org/drawingml/2006/chart" xmlns="">
       <p:transition/>
     </mc:Fallback>
   </mc:AlternateContent>
@@ -15144,7 +15090,7 @@
     <mc:Choice Requires="p14">
       <p:transition/>
     </mc:Choice>
-    <mc:Fallback xmlns="" xmlns:c="http://schemas.openxmlformats.org/drawingml/2006/chart" xmlns:dgm="http://schemas.openxmlformats.org/drawingml/2006/diagram" xmlns:dsp="http://schemas.microsoft.com/office/drawing/2008/diagram">
+    <mc:Fallback xmlns:dsp="http://schemas.microsoft.com/office/drawing/2008/diagram" xmlns:dgm="http://schemas.openxmlformats.org/drawingml/2006/diagram" xmlns:c="http://schemas.openxmlformats.org/drawingml/2006/chart" xmlns="">
       <p:transition/>
     </mc:Fallback>
   </mc:AlternateContent>
@@ -15381,7 +15327,11 @@
           <a:p>
             <a:r>
               <a:rPr lang="ko-KR" altLang="en-US" sz="3200" dirty="0" smtClean="0"/>
-              <a:t>흉부 방사선 사진에서 구조와 질감을 분리 후 </a:t>
+              <a:t>흉부 방사선 사진에서 </a:t>
+            </a:r>
+            <a:r>
+              <a:rPr lang="ko-KR" altLang="en-US" sz="3200" b="1" dirty="0" smtClean="0"/>
+              <a:t>구조와 질감을 분리 후 </a:t>
             </a:r>
             <a:r>
               <a:rPr lang="en-US" altLang="ko-KR" sz="3200" dirty="0" smtClean="0"/>
@@ -15399,10 +15349,10 @@
               <a:t> </a:t>
             </a:r>
             <a:r>
-              <a:rPr lang="ko-KR" altLang="en-US" sz="3200" dirty="0" smtClean="0"/>
+              <a:rPr lang="ko-KR" altLang="en-US" sz="3200" b="1" dirty="0" smtClean="0"/>
               <a:t>새로운 이미지를 만들어내는 방식</a:t>
             </a:r>
-            <a:endParaRPr lang="en-US" altLang="ko-KR" sz="3200" dirty="0" smtClean="0"/>
+            <a:endParaRPr lang="en-US" altLang="ko-KR" sz="3200" b="1" dirty="0" smtClean="0"/>
           </a:p>
           <a:p>
             <a:endParaRPr lang="en-US" altLang="ko-KR" sz="3200" dirty="0" smtClean="0"/>
@@ -15435,12 +15385,16 @@
           </a:p>
           <a:p>
             <a:r>
-              <a:rPr lang="en-US" altLang="ko-KR" sz="3200" dirty="0" smtClean="0"/>
+              <a:rPr lang="en-US" altLang="ko-KR" sz="3200" b="1" dirty="0" smtClean="0"/>
               <a:t>SAE</a:t>
             </a:r>
             <a:r>
+              <a:rPr lang="ko-KR" altLang="en-US" sz="3200" b="1" dirty="0" smtClean="0"/>
+              <a:t>는</a:t>
+            </a:r>
+            <a:r>
               <a:rPr lang="ko-KR" altLang="en-US" sz="3200" dirty="0" smtClean="0"/>
-              <a:t>는 전체 이미지를 대상으로 </a:t>
+              <a:t> 전체 이미지를 대상으로 </a:t>
             </a:r>
             <a:r>
               <a:rPr lang="ko-KR" altLang="en-US" sz="3200" dirty="0" err="1" smtClean="0"/>
@@ -15462,11 +15416,11 @@
               <a:t> </a:t>
             </a:r>
             <a:r>
-              <a:rPr lang="ko-KR" altLang="en-US" sz="3200" dirty="0" smtClean="0"/>
+              <a:rPr lang="ko-KR" altLang="en-US" sz="3200" b="1" dirty="0" smtClean="0"/>
               <a:t>흉부 방사선 사진에서는 잘 동작하지 않는다</a:t>
             </a:r>
             <a:r>
-              <a:rPr lang="en-US" altLang="ko-KR" sz="3200" dirty="0" smtClean="0"/>
+              <a:rPr lang="en-US" altLang="ko-KR" sz="3200" b="1" dirty="0" smtClean="0"/>
               <a:t>.</a:t>
             </a:r>
           </a:p>
@@ -15499,7 +15453,15 @@
             </a:r>
             <a:r>
               <a:rPr lang="ko-KR" altLang="en-US" sz="3200" dirty="0" smtClean="0"/>
-              <a:t>폐 내부의 텍스처 전송의 효과를 감소시키기 때문이며</a:t>
+              <a:t>폐 내부의 </a:t>
+            </a:r>
+            <a:r>
+              <a:rPr lang="ko-KR" altLang="en-US" sz="3200" b="1" dirty="0" smtClean="0"/>
+              <a:t>텍스처 전송의 효과를 감소</a:t>
+            </a:r>
+            <a:r>
+              <a:rPr lang="ko-KR" altLang="en-US" sz="3200" dirty="0" smtClean="0"/>
+              <a:t>시키기 때문이며</a:t>
             </a:r>
             <a:r>
               <a:rPr lang="en-US" altLang="ko-KR" sz="3200" dirty="0" smtClean="0"/>
@@ -15509,15 +15471,23 @@
           <a:p>
             <a:r>
               <a:rPr lang="ko-KR" altLang="en-US" sz="3200" dirty="0" smtClean="0"/>
-              <a:t>이러한 과정에서 원치 않는 폐 모양의 왜곡이</a:t>
-            </a:r>
-            <a:r>
-              <a:rPr lang="en-US" altLang="ko-KR" sz="3200" dirty="0"/>
+              <a:t>이러한 과정에서 원치 않는 </a:t>
+            </a:r>
+            <a:r>
+              <a:rPr lang="ko-KR" altLang="en-US" sz="3200" b="1" dirty="0" smtClean="0"/>
+              <a:t>폐 모양의 왜곡이</a:t>
+            </a:r>
+            <a:r>
+              <a:rPr lang="en-US" altLang="ko-KR" sz="3200" b="1" dirty="0"/>
               <a:t> </a:t>
             </a:r>
             <a:r>
+              <a:rPr lang="ko-KR" altLang="en-US" sz="3200" b="1" dirty="0" smtClean="0"/>
+              <a:t>발생</a:t>
+            </a:r>
+            <a:r>
               <a:rPr lang="ko-KR" altLang="en-US" sz="3200" dirty="0" smtClean="0"/>
-              <a:t>발생하여서 </a:t>
+              <a:t>하여서 </a:t>
             </a:r>
             <a:endParaRPr lang="en-US" altLang="ko-KR" sz="3200" dirty="0" smtClean="0"/>
           </a:p>
@@ -15592,7 +15562,7 @@
     <mc:Choice Requires="p14">
       <p:transition/>
     </mc:Choice>
-    <mc:Fallback xmlns="" xmlns:c="http://schemas.openxmlformats.org/drawingml/2006/chart" xmlns:dgm="http://schemas.openxmlformats.org/drawingml/2006/diagram" xmlns:dsp="http://schemas.microsoft.com/office/drawing/2008/diagram">
+    <mc:Fallback xmlns:dsp="http://schemas.microsoft.com/office/drawing/2008/diagram" xmlns:dgm="http://schemas.openxmlformats.org/drawingml/2006/diagram" xmlns:c="http://schemas.openxmlformats.org/drawingml/2006/chart" xmlns="">
       <p:transition/>
     </mc:Fallback>
   </mc:AlternateContent>
@@ -15806,8 +15776,12 @@
           </a:p>
           <a:p>
             <a:r>
+              <a:rPr lang="ko-KR" altLang="en-US" sz="3200" b="1" dirty="0" smtClean="0"/>
+              <a:t>한 환자의 폐 구조와 다른 환자의 질병 질감</a:t>
+            </a:r>
+            <a:r>
               <a:rPr lang="ko-KR" altLang="en-US" sz="3200" dirty="0" smtClean="0"/>
-              <a:t>한 환자의 폐 구조와 다른 환자의 질병 질감을 사용하여 현실적인 </a:t>
+              <a:t>을 사용하여 현실적인 </a:t>
             </a:r>
             <a:endParaRPr lang="en-US" altLang="ko-KR" sz="3200" dirty="0" smtClean="0"/>
           </a:p>
@@ -15818,10 +15792,14 @@
             </a:r>
             <a:r>
               <a:rPr lang="ko-KR" altLang="en-US" sz="3200" dirty="0" smtClean="0"/>
-              <a:t> 흉부 방사선 사진을 생성</a:t>
-            </a:r>
-            <a:r>
-              <a:rPr lang="en-US" altLang="ko-KR" sz="3200" dirty="0" smtClean="0"/>
+              <a:t> </a:t>
+            </a:r>
+            <a:r>
+              <a:rPr lang="ko-KR" altLang="en-US" sz="3200" b="1" dirty="0" smtClean="0"/>
+              <a:t>흉부 방사선 사진을 생성</a:t>
+            </a:r>
+            <a:r>
+              <a:rPr lang="en-US" altLang="ko-KR" sz="3200" b="1" dirty="0" smtClean="0"/>
               <a:t>.</a:t>
             </a:r>
           </a:p>
@@ -15918,7 +15896,7 @@
     <mc:Choice Requires="p14">
       <p:transition/>
     </mc:Choice>
-    <mc:Fallback xmlns="" xmlns:c="http://schemas.openxmlformats.org/drawingml/2006/chart" xmlns:dgm="http://schemas.openxmlformats.org/drawingml/2006/diagram" xmlns:dsp="http://schemas.microsoft.com/office/drawing/2008/diagram">
+    <mc:Fallback xmlns:dsp="http://schemas.microsoft.com/office/drawing/2008/diagram" xmlns:dgm="http://schemas.openxmlformats.org/drawingml/2006/diagram" xmlns:c="http://schemas.openxmlformats.org/drawingml/2006/chart" xmlns="">
       <p:transition/>
     </mc:Fallback>
   </mc:AlternateContent>
@@ -16165,7 +16143,7 @@
     <mc:Choice Requires="p14">
       <p:transition/>
     </mc:Choice>
-    <mc:Fallback xmlns="" xmlns:c="http://schemas.openxmlformats.org/drawingml/2006/chart" xmlns:dgm="http://schemas.openxmlformats.org/drawingml/2006/diagram" xmlns:dsp="http://schemas.microsoft.com/office/drawing/2008/diagram">
+    <mc:Fallback xmlns:dsp="http://schemas.microsoft.com/office/drawing/2008/diagram" xmlns:dgm="http://schemas.openxmlformats.org/drawingml/2006/diagram" xmlns:c="http://schemas.openxmlformats.org/drawingml/2006/chart" xmlns="">
       <p:transition/>
     </mc:Fallback>
   </mc:AlternateContent>
@@ -17305,7 +17283,7 @@
     <mc:Choice Requires="p14">
       <p:transition/>
     </mc:Choice>
-    <mc:Fallback xmlns="" xmlns:c="http://schemas.openxmlformats.org/drawingml/2006/chart" xmlns:dgm="http://schemas.openxmlformats.org/drawingml/2006/diagram" xmlns:dsp="http://schemas.microsoft.com/office/drawing/2008/diagram">
+    <mc:Fallback xmlns:dsp="http://schemas.microsoft.com/office/drawing/2008/diagram" xmlns:dgm="http://schemas.openxmlformats.org/drawingml/2006/diagram" xmlns:c="http://schemas.openxmlformats.org/drawingml/2006/chart" xmlns="">
       <p:transition/>
     </mc:Fallback>
   </mc:AlternateContent>
@@ -20801,6 +20779,36 @@
           </p:sp>
         </mc:Fallback>
       </mc:AlternateContent>
+      <p:sp>
+        <p:nvSpPr>
+          <p:cNvPr id="3" name="TextBox 2"/>
+          <p:cNvSpPr txBox="1"/>
+          <p:nvPr/>
+        </p:nvSpPr>
+        <p:spPr>
+          <a:xfrm>
+            <a:off x="11423650" y="1616075"/>
+            <a:ext cx="4692631" cy="369332"/>
+          </a:xfrm>
+          <a:prstGeom prst="rect">
+            <a:avLst/>
+          </a:prstGeom>
+          <a:noFill/>
+        </p:spPr>
+        <p:txBody>
+          <a:bodyPr wrap="none" rtlCol="0">
+            <a:spAutoFit/>
+          </a:bodyPr>
+          <a:lstStyle/>
+          <a:p>
+            <a:r>
+              <a:rPr lang="en-US" altLang="ko-KR" dirty="0" smtClean="0"/>
+              <a:t>Cross-entropy loss N-way classification problem</a:t>
+            </a:r>
+            <a:endParaRPr lang="ko-KR" altLang="en-US" dirty="0"/>
+          </a:p>
+        </p:txBody>
+      </p:sp>
     </p:spTree>
     <p:extLst>
       <p:ext uri="{BB962C8B-B14F-4D97-AF65-F5344CB8AC3E}">
@@ -20815,7 +20823,7 @@
     <mc:Choice Requires="p14">
       <p:transition/>
     </mc:Choice>
-    <mc:Fallback xmlns="" xmlns:c="http://schemas.openxmlformats.org/drawingml/2006/chart" xmlns:dgm="http://schemas.openxmlformats.org/drawingml/2006/diagram" xmlns:dsp="http://schemas.microsoft.com/office/drawing/2008/diagram">
+    <mc:Fallback xmlns:dsp="http://schemas.microsoft.com/office/drawing/2008/diagram" xmlns:dgm="http://schemas.openxmlformats.org/drawingml/2006/diagram" xmlns:c="http://schemas.openxmlformats.org/drawingml/2006/chart" xmlns="">
       <p:transition/>
     </mc:Fallback>
   </mc:AlternateContent>

</xml_diff>